<commit_message>
Fixing ACL issue due to S3 changes by removing idle AWSLoggingBucket and removing unnecessary ACL in CloudTrail bucket; updated architecture diagram
</commit_message>
<xml_diff>
--- a/docs/images/quickstart-compliance-hipaa-architecture.pptx
+++ b/docs/images/quickstart-compliance-hipaa-architecture.pptx
@@ -225,7 +225,7 @@
           <a:p>
             <a:fld id="{49A7721D-1176-A640-AC48-B82F78C92D56}" type="datetimeFigureOut">
               <a:rPr lang="en-US" smtClean="0"/>
-              <a:t>4/30/2021</a:t>
+              <a:t>5/30/23</a:t>
             </a:fld>
             <a:endParaRPr lang="en-US" dirty="0"/>
           </a:p>
@@ -402,7 +402,7 @@
           <a:p>
             <a:fld id="{C884A089-FB25-6D46-9D21-F0F04A18BCA8}" type="datetimeFigureOut">
               <a:rPr lang="en-US" smtClean="0"/>
-              <a:t>4/30/2021</a:t>
+              <a:t>5/30/23</a:t>
             </a:fld>
             <a:endParaRPr lang="en-US" dirty="0"/>
           </a:p>
@@ -1169,7 +1169,7 @@
           <a:blip r:embed="rId2">
             <a:extLst>
               <a:ext uri="{96DAC541-7B7A-43D3-8B79-37D633B846F1}">
-                <asvg:svgBlip xmlns="" xmlns:asvg="http://schemas.microsoft.com/office/drawing/2016/SVG/main" r:embed="rId3"/>
+                <asvg:svgBlip xmlns:asvg="http://schemas.microsoft.com/office/drawing/2016/SVG/main" r:embed="rId3"/>
               </a:ext>
             </a:extLst>
           </a:blip>
@@ -1671,21 +1671,8 @@
                 <a:ea typeface="Amazon Ember" panose="020B0603020204020204" pitchFamily="34" charset="0"/>
                 <a:cs typeface="Arial" panose="020B0604020202020204" pitchFamily="34" charset="0"/>
               </a:rPr>
-              <a:t>AWS </a:t>
+              <a:t>AWS Site-to-Site VPN</a:t>
             </a:r>
-            <a:r>
-              <a:rPr lang="en-US" altLang="en-US" sz="1200" dirty="0" smtClean="0">
-                <a:latin typeface="+mn-lt"/>
-                <a:ea typeface="Amazon Ember" panose="020B0603020204020204" pitchFamily="34" charset="0"/>
-                <a:cs typeface="Arial" panose="020B0604020202020204" pitchFamily="34" charset="0"/>
-              </a:rPr>
-              <a:t>Site-to-Site VPN</a:t>
-            </a:r>
-            <a:endParaRPr lang="en-US" altLang="en-US" sz="1200" dirty="0">
-              <a:latin typeface="+mn-lt"/>
-              <a:ea typeface="Amazon Ember" panose="020B0603020204020204" pitchFamily="34" charset="0"/>
-              <a:cs typeface="Arial" panose="020B0604020202020204" pitchFamily="34" charset="0"/>
-            </a:endParaRPr>
           </a:p>
         </p:txBody>
       </p:sp>
@@ -1974,23 +1961,8 @@
                 </a:solidFill>
                 <a:cs typeface="Arial" panose="020B0604020202020204" pitchFamily="34" charset="0"/>
               </a:rPr>
-              <a:t>Customer </a:t>
+              <a:t>Customer connectivity</a:t>
             </a:r>
-            <a:r>
-              <a:rPr lang="en-US" sz="1200" dirty="0" smtClean="0">
-                <a:solidFill>
-                  <a:srgbClr val="5A6B86"/>
-                </a:solidFill>
-                <a:cs typeface="Arial" panose="020B0604020202020204" pitchFamily="34" charset="0"/>
-              </a:rPr>
-              <a:t>connectivity</a:t>
-            </a:r>
-            <a:endParaRPr lang="en-US" sz="1200" dirty="0">
-              <a:solidFill>
-                <a:srgbClr val="5A6B86"/>
-              </a:solidFill>
-              <a:cs typeface="Arial" panose="020B0604020202020204" pitchFamily="34" charset="0"/>
-            </a:endParaRPr>
           </a:p>
         </p:txBody>
       </p:sp>
@@ -2408,23 +2380,8 @@
                 </a:solidFill>
                 <a:cs typeface="Arial" panose="020B0604020202020204" pitchFamily="34" charset="0"/>
               </a:rPr>
-              <a:t>Availability </a:t>
+              <a:t>Availability Zone 1</a:t>
             </a:r>
-            <a:r>
-              <a:rPr lang="en-US" sz="1200" dirty="0" smtClean="0">
-                <a:solidFill>
-                  <a:srgbClr val="5B9CD5"/>
-                </a:solidFill>
-                <a:cs typeface="Arial" panose="020B0604020202020204" pitchFamily="34" charset="0"/>
-              </a:rPr>
-              <a:t>Zone 1</a:t>
-            </a:r>
-            <a:endParaRPr lang="en-US" sz="1200" dirty="0">
-              <a:solidFill>
-                <a:srgbClr val="5B9CD5"/>
-              </a:solidFill>
-              <a:cs typeface="Arial" panose="020B0604020202020204" pitchFamily="34" charset="0"/>
-            </a:endParaRPr>
           </a:p>
         </p:txBody>
       </p:sp>
@@ -2492,23 +2449,8 @@
                 </a:solidFill>
                 <a:cs typeface="Arial" panose="020B0604020202020204" pitchFamily="34" charset="0"/>
               </a:rPr>
-              <a:t>Availability </a:t>
+              <a:t>Availability Zone 2</a:t>
             </a:r>
-            <a:r>
-              <a:rPr lang="en-US" sz="1200" dirty="0" smtClean="0">
-                <a:solidFill>
-                  <a:srgbClr val="5B9CD5"/>
-                </a:solidFill>
-                <a:cs typeface="Arial" panose="020B0604020202020204" pitchFamily="34" charset="0"/>
-              </a:rPr>
-              <a:t>Zone 2</a:t>
-            </a:r>
-            <a:endParaRPr lang="en-US" sz="1200" dirty="0">
-              <a:solidFill>
-                <a:srgbClr val="5B9CD5"/>
-              </a:solidFill>
-              <a:cs typeface="Arial" panose="020B0604020202020204" pitchFamily="34" charset="0"/>
-            </a:endParaRPr>
           </a:p>
         </p:txBody>
       </p:sp>
@@ -3188,23 +3130,8 @@
                 </a:solidFill>
                 <a:cs typeface="Arial" panose="020B0604020202020204" pitchFamily="34" charset="0"/>
               </a:rPr>
-              <a:t>Availability </a:t>
+              <a:t>Availability Zone 1</a:t>
             </a:r>
-            <a:r>
-              <a:rPr lang="en-US" sz="1200" dirty="0" smtClean="0">
-                <a:solidFill>
-                  <a:srgbClr val="5B9CD5"/>
-                </a:solidFill>
-                <a:cs typeface="Arial" panose="020B0604020202020204" pitchFamily="34" charset="0"/>
-              </a:rPr>
-              <a:t>Zone 1</a:t>
-            </a:r>
-            <a:endParaRPr lang="en-US" sz="1200" dirty="0">
-              <a:solidFill>
-                <a:srgbClr val="5B9CD5"/>
-              </a:solidFill>
-              <a:cs typeface="Arial" panose="020B0604020202020204" pitchFamily="34" charset="0"/>
-            </a:endParaRPr>
           </a:p>
         </p:txBody>
       </p:sp>
@@ -3403,23 +3330,8 @@
                 </a:solidFill>
                 <a:cs typeface="Arial" panose="020B0604020202020204" pitchFamily="34" charset="0"/>
               </a:rPr>
-              <a:t>Availability </a:t>
+              <a:t>Availability Zone 2</a:t>
             </a:r>
-            <a:r>
-              <a:rPr lang="en-US" sz="1200" dirty="0" smtClean="0">
-                <a:solidFill>
-                  <a:srgbClr val="5B9CD5"/>
-                </a:solidFill>
-                <a:cs typeface="Arial" panose="020B0604020202020204" pitchFamily="34" charset="0"/>
-              </a:rPr>
-              <a:t>Zone 2</a:t>
-            </a:r>
-            <a:endParaRPr lang="en-US" sz="1200" dirty="0">
-              <a:solidFill>
-                <a:srgbClr val="5B9CD5"/>
-              </a:solidFill>
-              <a:cs typeface="Arial" panose="020B0604020202020204" pitchFamily="34" charset="0"/>
-            </a:endParaRPr>
           </a:p>
         </p:txBody>
       </p:sp>
@@ -3968,23 +3880,8 @@
                 </a:solidFill>
                 <a:cs typeface="Arial" panose="020B0604020202020204" pitchFamily="34" charset="0"/>
               </a:rPr>
-              <a:t>Availability </a:t>
+              <a:t>Availability Zone 1</a:t>
             </a:r>
-            <a:r>
-              <a:rPr lang="en-US" sz="1200" dirty="0" smtClean="0">
-                <a:solidFill>
-                  <a:srgbClr val="5B9CD5"/>
-                </a:solidFill>
-                <a:cs typeface="Arial" panose="020B0604020202020204" pitchFamily="34" charset="0"/>
-              </a:rPr>
-              <a:t>Zone 1</a:t>
-            </a:r>
-            <a:endParaRPr lang="en-US" sz="1200" dirty="0">
-              <a:solidFill>
-                <a:srgbClr val="5B9CD5"/>
-              </a:solidFill>
-              <a:cs typeface="Arial" panose="020B0604020202020204" pitchFamily="34" charset="0"/>
-            </a:endParaRPr>
           </a:p>
         </p:txBody>
       </p:sp>
@@ -4183,23 +4080,8 @@
                 </a:solidFill>
                 <a:cs typeface="Arial" panose="020B0604020202020204" pitchFamily="34" charset="0"/>
               </a:rPr>
-              <a:t>Availability </a:t>
+              <a:t>Availability Zone 2</a:t>
             </a:r>
-            <a:r>
-              <a:rPr lang="en-US" sz="1200" dirty="0" smtClean="0">
-                <a:solidFill>
-                  <a:srgbClr val="5B9CD5"/>
-                </a:solidFill>
-                <a:cs typeface="Arial" panose="020B0604020202020204" pitchFamily="34" charset="0"/>
-              </a:rPr>
-              <a:t>Zone 2</a:t>
-            </a:r>
-            <a:endParaRPr lang="en-US" sz="1200" dirty="0">
-              <a:solidFill>
-                <a:srgbClr val="5B9CD5"/>
-              </a:solidFill>
-              <a:cs typeface="Arial" panose="020B0604020202020204" pitchFamily="34" charset="0"/>
-            </a:endParaRPr>
           </a:p>
         </p:txBody>
       </p:sp>
@@ -4638,18 +4520,13 @@
           <a:p>
             <a:pPr algn="ctr" eaLnBrk="1" hangingPunct="1"/>
             <a:r>
-              <a:rPr lang="en-US" altLang="en-US" sz="1200" dirty="0" smtClean="0">
+              <a:rPr lang="en-US" altLang="en-US" sz="1200" dirty="0">
                 <a:latin typeface="+mn-lt"/>
                 <a:ea typeface="Amazon Ember" panose="020B0603020204020204" pitchFamily="34" charset="0"/>
                 <a:cs typeface="Arial" panose="020B0604020202020204" pitchFamily="34" charset="0"/>
               </a:rPr>
               <a:t>IAM</a:t>
             </a:r>
-            <a:endParaRPr lang="en-US" altLang="en-US" sz="1200" dirty="0">
-              <a:latin typeface="+mn-lt"/>
-              <a:ea typeface="Amazon Ember" panose="020B0603020204020204" pitchFamily="34" charset="0"/>
-              <a:cs typeface="Arial" panose="020B0604020202020204" pitchFamily="34" charset="0"/>
-            </a:endParaRPr>
           </a:p>
         </p:txBody>
       </p:sp>
@@ -4864,18 +4741,13 @@
           <a:p>
             <a:pPr algn="ctr" eaLnBrk="1" hangingPunct="1"/>
             <a:r>
-              <a:rPr lang="en-US" altLang="en-US" sz="1200" dirty="0" smtClean="0">
+              <a:rPr lang="en-US" altLang="en-US" sz="1200" dirty="0">
                 <a:latin typeface="+mn-lt"/>
                 <a:ea typeface="Amazon Ember" panose="020B0603020204020204" pitchFamily="34" charset="0"/>
                 <a:cs typeface="Arial" panose="020B0604020202020204" pitchFamily="34" charset="0"/>
               </a:rPr>
               <a:t>SNS</a:t>
             </a:r>
-            <a:endParaRPr lang="en-US" altLang="en-US" sz="1200" dirty="0">
-              <a:latin typeface="+mn-lt"/>
-              <a:ea typeface="Amazon Ember" panose="020B0603020204020204" pitchFamily="34" charset="0"/>
-              <a:cs typeface="Arial" panose="020B0604020202020204" pitchFamily="34" charset="0"/>
-            </a:endParaRPr>
           </a:p>
         </p:txBody>
       </p:sp>
@@ -4943,41 +4815,8 @@
                 </a:solidFill>
                 <a:cs typeface="Arial" panose="020B0604020202020204" pitchFamily="34" charset="0"/>
               </a:rPr>
-              <a:t>Access </a:t>
+              <a:t>Access control and alerting</a:t>
             </a:r>
-            <a:r>
-              <a:rPr lang="en-US" sz="1200" dirty="0" smtClean="0">
-                <a:solidFill>
-                  <a:srgbClr val="5A6B86"/>
-                </a:solidFill>
-                <a:cs typeface="Arial" panose="020B0604020202020204" pitchFamily="34" charset="0"/>
-              </a:rPr>
-              <a:t>control </a:t>
-            </a:r>
-            <a:r>
-              <a:rPr lang="en-US" sz="1200" dirty="0">
-                <a:solidFill>
-                  <a:srgbClr val="5A6B86"/>
-                </a:solidFill>
-                <a:cs typeface="Arial" panose="020B0604020202020204" pitchFamily="34" charset="0"/>
-              </a:rPr>
-              <a:t>and </a:t>
-            </a:r>
-            <a:r>
-              <a:rPr lang="en-US" sz="1200" dirty="0" smtClean="0">
-                <a:solidFill>
-                  <a:srgbClr val="5A6B86"/>
-                </a:solidFill>
-                <a:cs typeface="Arial" panose="020B0604020202020204" pitchFamily="34" charset="0"/>
-              </a:rPr>
-              <a:t>alerting</a:t>
-            </a:r>
-            <a:endParaRPr lang="en-US" sz="1200" dirty="0">
-              <a:solidFill>
-                <a:srgbClr val="5A6B86"/>
-              </a:solidFill>
-              <a:cs typeface="Arial" panose="020B0604020202020204" pitchFamily="34" charset="0"/>
-            </a:endParaRPr>
           </a:p>
         </p:txBody>
       </p:sp>
@@ -5067,7 +4906,6 @@
           <a:ln>
             <a:noFill/>
           </a:ln>
-          <a:extLst/>
         </p:spPr>
       </p:pic>
       <p:pic>
@@ -5286,71 +5124,11 @@
                 <a:ea typeface="Amazon Ember" panose="020B0603020204020204" pitchFamily="34" charset="0"/>
                 <a:cs typeface="Arial" panose="020B0604020202020204" pitchFamily="34" charset="0"/>
               </a:rPr>
-              <a:t>C</a:t>
+              <a:t>CloudTrail</a:t>
             </a:r>
-            <a:r>
-              <a:rPr lang="en-US" altLang="en-US" sz="1200" dirty="0" smtClean="0">
-                <a:latin typeface="+mn-lt"/>
-                <a:ea typeface="Amazon Ember" panose="020B0603020204020204" pitchFamily="34" charset="0"/>
-                <a:cs typeface="Arial" panose="020B0604020202020204" pitchFamily="34" charset="0"/>
-              </a:rPr>
-              <a:t>loudTrail</a:t>
-            </a:r>
-            <a:endParaRPr lang="en-US" altLang="en-US" sz="1200" dirty="0">
-              <a:latin typeface="+mn-lt"/>
-              <a:ea typeface="Amazon Ember" panose="020B0603020204020204" pitchFamily="34" charset="0"/>
-              <a:cs typeface="Arial" panose="020B0604020202020204" pitchFamily="34" charset="0"/>
-            </a:endParaRPr>
           </a:p>
         </p:txBody>
       </p:sp>
-      <p:cxnSp>
-        <p:nvCxnSpPr>
-          <p:cNvPr id="84" name="Straight Arrow Connector 83">
-            <a:extLst>
-              <a:ext uri="{FF2B5EF4-FFF2-40B4-BE49-F238E27FC236}">
-                <a16:creationId xmlns:a16="http://schemas.microsoft.com/office/drawing/2014/main" id="{C3F4583D-0A13-4DF5-A89D-FA364CD3ED42}"/>
-              </a:ext>
-            </a:extLst>
-          </p:cNvPr>
-          <p:cNvCxnSpPr>
-            <a:cxnSpLocks/>
-            <a:stCxn id="95" idx="3"/>
-            <a:endCxn id="93" idx="1"/>
-          </p:cNvCxnSpPr>
-          <p:nvPr/>
-        </p:nvCxnSpPr>
-        <p:spPr>
-          <a:xfrm flipV="1">
-            <a:off x="10073711" y="964742"/>
-            <a:ext cx="465427" cy="1"/>
-          </a:xfrm>
-          <a:prstGeom prst="straightConnector1">
-            <a:avLst/>
-          </a:prstGeom>
-          <a:ln w="12700">
-            <a:solidFill>
-              <a:srgbClr val="545B64"/>
-            </a:solidFill>
-            <a:headEnd type="none" w="med" len="sm"/>
-            <a:tailEnd type="arrow" w="med" len="sm"/>
-          </a:ln>
-        </p:spPr>
-        <p:style>
-          <a:lnRef idx="1">
-            <a:schemeClr val="accent1"/>
-          </a:lnRef>
-          <a:fillRef idx="0">
-            <a:schemeClr val="accent1"/>
-          </a:fillRef>
-          <a:effectRef idx="0">
-            <a:schemeClr val="accent1"/>
-          </a:effectRef>
-          <a:fontRef idx="minor">
-            <a:schemeClr val="tx1"/>
-          </a:fontRef>
-        </p:style>
-      </p:cxnSp>
       <p:cxnSp>
         <p:nvCxnSpPr>
           <p:cNvPr id="87" name="Straight Arrow Connector 86">
@@ -5460,66 +5238,6 @@
       </p:pic>
       <p:pic>
         <p:nvPicPr>
-          <p:cNvPr id="93" name="Graphic 14">
-            <a:extLst>
-              <a:ext uri="{FF2B5EF4-FFF2-40B4-BE49-F238E27FC236}">
-                <a16:creationId xmlns:a16="http://schemas.microsoft.com/office/drawing/2014/main" id="{3B6C367A-DF0B-4145-BC22-1066579E478D}"/>
-              </a:ext>
-            </a:extLst>
-          </p:cNvPr>
-          <p:cNvPicPr>
-            <a:picLocks noChangeAspect="1" noChangeArrowheads="1"/>
-          </p:cNvPicPr>
-          <p:nvPr/>
-        </p:nvPicPr>
-        <p:blipFill>
-          <a:blip r:embed="rId14">
-            <a:extLst>
-              <a:ext uri="{28A0092B-C50C-407E-A947-70E740481C1C}">
-                <a14:useLocalDpi xmlns:a14="http://schemas.microsoft.com/office/drawing/2010/main" val="0"/>
-              </a:ext>
-            </a:extLst>
-          </a:blip>
-          <a:srcRect/>
-          <a:stretch>
-            <a:fillRect/>
-          </a:stretch>
-        </p:blipFill>
-        <p:spPr bwMode="auto">
-          <a:xfrm>
-            <a:off x="10539138" y="736142"/>
-            <a:ext cx="457200" cy="457200"/>
-          </a:xfrm>
-          <a:prstGeom prst="rect">
-            <a:avLst/>
-          </a:prstGeom>
-          <a:noFill/>
-          <a:ln>
-            <a:noFill/>
-          </a:ln>
-          <a:extLst>
-            <a:ext uri="{909E8E84-426E-40DD-AFC4-6F175D3DCCD1}">
-              <a14:hiddenFill xmlns:a14="http://schemas.microsoft.com/office/drawing/2010/main">
-                <a:solidFill>
-                  <a:srgbClr val="FFFFFF"/>
-                </a:solidFill>
-              </a14:hiddenFill>
-            </a:ext>
-            <a:ext uri="{91240B29-F687-4F45-9708-019B960494DF}">
-              <a14:hiddenLine xmlns:a14="http://schemas.microsoft.com/office/drawing/2010/main" w="9525">
-                <a:solidFill>
-                  <a:srgbClr val="000000"/>
-                </a:solidFill>
-                <a:miter lim="800000"/>
-                <a:headEnd/>
-                <a:tailEnd/>
-              </a14:hiddenLine>
-            </a:ext>
-          </a:extLst>
-        </p:spPr>
-      </p:pic>
-      <p:pic>
-        <p:nvPicPr>
           <p:cNvPr id="95" name="Graphic 17">
             <a:extLst>
               <a:ext uri="{FF2B5EF4-FFF2-40B4-BE49-F238E27FC236}">
@@ -5729,18 +5447,13 @@
           <a:p>
             <a:pPr algn="ctr" eaLnBrk="1" hangingPunct="1"/>
             <a:r>
-              <a:rPr lang="en-US" altLang="en-US" sz="1200" dirty="0" smtClean="0">
+              <a:rPr lang="en-US" altLang="en-US" sz="1200" dirty="0">
                 <a:latin typeface="+mn-lt"/>
                 <a:ea typeface="Amazon Ember" panose="020B0603020204020204" pitchFamily="34" charset="0"/>
                 <a:cs typeface="Arial" panose="020B0604020202020204" pitchFamily="34" charset="0"/>
               </a:rPr>
               <a:t>CloudWatch</a:t>
             </a:r>
-            <a:endParaRPr lang="en-US" altLang="en-US" sz="1200" dirty="0">
-              <a:latin typeface="+mn-lt"/>
-              <a:ea typeface="Amazon Ember" panose="020B0603020204020204" pitchFamily="34" charset="0"/>
-              <a:cs typeface="Arial" panose="020B0604020202020204" pitchFamily="34" charset="0"/>
-            </a:endParaRPr>
           </a:p>
         </p:txBody>
       </p:sp>
@@ -5964,184 +5677,13 @@
           <a:p>
             <a:pPr algn="ctr"/>
             <a:r>
-              <a:rPr lang="en-US" altLang="en-US" sz="1200" dirty="0" smtClean="0">
+              <a:rPr lang="en-US" altLang="en-US" sz="1200" dirty="0">
                 <a:latin typeface="+mn-lt"/>
                 <a:ea typeface="Amazon Ember" panose="020B0603020204020204" pitchFamily="34" charset="0"/>
                 <a:cs typeface="Arial" panose="020B0604020202020204" pitchFamily="34" charset="0"/>
               </a:rPr>
               <a:t>S3</a:t>
             </a:r>
-            <a:endParaRPr lang="en-US" altLang="en-US" sz="1200" dirty="0">
-              <a:latin typeface="+mn-lt"/>
-              <a:ea typeface="Amazon Ember" panose="020B0603020204020204" pitchFamily="34" charset="0"/>
-              <a:cs typeface="Arial" panose="020B0604020202020204" pitchFamily="34" charset="0"/>
-            </a:endParaRPr>
-          </a:p>
-        </p:txBody>
-      </p:sp>
-      <p:sp>
-        <p:nvSpPr>
-          <p:cNvPr id="99" name="TextBox 9">
-            <a:extLst>
-              <a:ext uri="{FF2B5EF4-FFF2-40B4-BE49-F238E27FC236}">
-                <a16:creationId xmlns:a16="http://schemas.microsoft.com/office/drawing/2014/main" id="{7513BD9D-E4A6-41DD-AECB-83AC865DB564}"/>
-              </a:ext>
-            </a:extLst>
-          </p:cNvPr>
-          <p:cNvSpPr txBox="1">
-            <a:spLocks noChangeArrowheads="1"/>
-          </p:cNvSpPr>
-          <p:nvPr/>
-        </p:nvSpPr>
-        <p:spPr bwMode="auto">
-          <a:xfrm>
-            <a:off x="10402925" y="1206813"/>
-            <a:ext cx="741196" cy="277589"/>
-          </a:xfrm>
-          <a:prstGeom prst="rect">
-            <a:avLst/>
-          </a:prstGeom>
-          <a:noFill/>
-          <a:ln>
-            <a:noFill/>
-          </a:ln>
-          <a:extLst>
-            <a:ext uri="{909E8E84-426E-40DD-AFC4-6F175D3DCCD1}">
-              <a14:hiddenFill xmlns:a14="http://schemas.microsoft.com/office/drawing/2010/main">
-                <a:solidFill>
-                  <a:srgbClr val="FFFFFF"/>
-                </a:solidFill>
-              </a14:hiddenFill>
-            </a:ext>
-            <a:ext uri="{91240B29-F687-4F45-9708-019B960494DF}">
-              <a14:hiddenLine xmlns:a14="http://schemas.microsoft.com/office/drawing/2010/main" w="9525">
-                <a:solidFill>
-                  <a:srgbClr val="000000"/>
-                </a:solidFill>
-                <a:miter lim="800000"/>
-                <a:headEnd/>
-                <a:tailEnd/>
-              </a14:hiddenLine>
-            </a:ext>
-          </a:extLst>
-        </p:spPr>
-        <p:txBody>
-          <a:bodyPr wrap="square">
-            <a:spAutoFit/>
-          </a:bodyPr>
-          <a:lstStyle>
-            <a:lvl1pPr>
-              <a:defRPr>
-                <a:solidFill>
-                  <a:schemeClr val="tx1"/>
-                </a:solidFill>
-                <a:latin typeface="Calibri" panose="020F0502020204030204" pitchFamily="34" charset="0"/>
-              </a:defRPr>
-            </a:lvl1pPr>
-            <a:lvl2pPr marL="742950" indent="-285750">
-              <a:defRPr>
-                <a:solidFill>
-                  <a:schemeClr val="tx1"/>
-                </a:solidFill>
-                <a:latin typeface="Calibri" panose="020F0502020204030204" pitchFamily="34" charset="0"/>
-              </a:defRPr>
-            </a:lvl2pPr>
-            <a:lvl3pPr marL="1143000" indent="-228600">
-              <a:defRPr>
-                <a:solidFill>
-                  <a:schemeClr val="tx1"/>
-                </a:solidFill>
-                <a:latin typeface="Calibri" panose="020F0502020204030204" pitchFamily="34" charset="0"/>
-              </a:defRPr>
-            </a:lvl3pPr>
-            <a:lvl4pPr marL="1600200" indent="-228600">
-              <a:defRPr>
-                <a:solidFill>
-                  <a:schemeClr val="tx1"/>
-                </a:solidFill>
-                <a:latin typeface="Calibri" panose="020F0502020204030204" pitchFamily="34" charset="0"/>
-              </a:defRPr>
-            </a:lvl4pPr>
-            <a:lvl5pPr marL="2057400" indent="-228600">
-              <a:defRPr>
-                <a:solidFill>
-                  <a:schemeClr val="tx1"/>
-                </a:solidFill>
-                <a:latin typeface="Calibri" panose="020F0502020204030204" pitchFamily="34" charset="0"/>
-              </a:defRPr>
-            </a:lvl5pPr>
-            <a:lvl6pPr marL="2514600" indent="-228600" eaLnBrk="0" fontAlgn="base" hangingPunct="0">
-              <a:spcBef>
-                <a:spcPct val="0"/>
-              </a:spcBef>
-              <a:spcAft>
-                <a:spcPct val="0"/>
-              </a:spcAft>
-              <a:defRPr>
-                <a:solidFill>
-                  <a:schemeClr val="tx1"/>
-                </a:solidFill>
-                <a:latin typeface="Calibri" panose="020F0502020204030204" pitchFamily="34" charset="0"/>
-              </a:defRPr>
-            </a:lvl6pPr>
-            <a:lvl7pPr marL="2971800" indent="-228600" eaLnBrk="0" fontAlgn="base" hangingPunct="0">
-              <a:spcBef>
-                <a:spcPct val="0"/>
-              </a:spcBef>
-              <a:spcAft>
-                <a:spcPct val="0"/>
-              </a:spcAft>
-              <a:defRPr>
-                <a:solidFill>
-                  <a:schemeClr val="tx1"/>
-                </a:solidFill>
-                <a:latin typeface="Calibri" panose="020F0502020204030204" pitchFamily="34" charset="0"/>
-              </a:defRPr>
-            </a:lvl7pPr>
-            <a:lvl8pPr marL="3429000" indent="-228600" eaLnBrk="0" fontAlgn="base" hangingPunct="0">
-              <a:spcBef>
-                <a:spcPct val="0"/>
-              </a:spcBef>
-              <a:spcAft>
-                <a:spcPct val="0"/>
-              </a:spcAft>
-              <a:defRPr>
-                <a:solidFill>
-                  <a:schemeClr val="tx1"/>
-                </a:solidFill>
-                <a:latin typeface="Calibri" panose="020F0502020204030204" pitchFamily="34" charset="0"/>
-              </a:defRPr>
-            </a:lvl8pPr>
-            <a:lvl9pPr marL="3886200" indent="-228600" eaLnBrk="0" fontAlgn="base" hangingPunct="0">
-              <a:spcBef>
-                <a:spcPct val="0"/>
-              </a:spcBef>
-              <a:spcAft>
-                <a:spcPct val="0"/>
-              </a:spcAft>
-              <a:defRPr>
-                <a:solidFill>
-                  <a:schemeClr val="tx1"/>
-                </a:solidFill>
-                <a:latin typeface="Calibri" panose="020F0502020204030204" pitchFamily="34" charset="0"/>
-              </a:defRPr>
-            </a:lvl9pPr>
-          </a:lstStyle>
-          <a:p>
-            <a:pPr algn="ctr"/>
-            <a:r>
-              <a:rPr lang="en-US" altLang="en-US" sz="1200" dirty="0" smtClean="0">
-                <a:latin typeface="+mn-lt"/>
-                <a:ea typeface="Amazon Ember" panose="020B0603020204020204" pitchFamily="34" charset="0"/>
-                <a:cs typeface="Arial" panose="020B0604020202020204" pitchFamily="34" charset="0"/>
-              </a:rPr>
-              <a:t>S3</a:t>
-            </a:r>
-            <a:endParaRPr lang="en-US" altLang="en-US" sz="1200" dirty="0">
-              <a:latin typeface="+mn-lt"/>
-              <a:ea typeface="Amazon Ember" panose="020B0603020204020204" pitchFamily="34" charset="0"/>
-              <a:cs typeface="Arial" panose="020B0604020202020204" pitchFamily="34" charset="0"/>
-            </a:endParaRPr>
           </a:p>
         </p:txBody>
       </p:sp>
@@ -6296,18 +5838,13 @@
           <a:p>
             <a:pPr algn="ctr"/>
             <a:r>
-              <a:rPr lang="en-US" altLang="en-US" sz="1200" dirty="0" smtClean="0">
+              <a:rPr lang="en-US" altLang="en-US" sz="1200" dirty="0">
                 <a:latin typeface="+mn-lt"/>
                 <a:ea typeface="Amazon Ember" panose="020B0603020204020204" pitchFamily="34" charset="0"/>
                 <a:cs typeface="Arial" panose="020B0604020202020204" pitchFamily="34" charset="0"/>
               </a:rPr>
               <a:t>S3</a:t>
             </a:r>
-            <a:endParaRPr lang="en-US" altLang="en-US" sz="1200" dirty="0">
-              <a:latin typeface="+mn-lt"/>
-              <a:ea typeface="Amazon Ember" panose="020B0603020204020204" pitchFamily="34" charset="0"/>
-              <a:cs typeface="Arial" panose="020B0604020202020204" pitchFamily="34" charset="0"/>
-            </a:endParaRPr>
           </a:p>
         </p:txBody>
       </p:sp>
@@ -6790,20 +6327,12 @@
           <a:p>
             <a:pPr algn="ctr" eaLnBrk="1" hangingPunct="1"/>
             <a:r>
-              <a:rPr lang="en-US" altLang="en-US" sz="1200" dirty="0" smtClean="0">
-                <a:latin typeface="+mn-lt"/>
-                <a:ea typeface="Amazon Ember" panose="020B0603020204020204" pitchFamily="34" charset="0"/>
-                <a:cs typeface="Arial" panose="020B0604020202020204" pitchFamily="34" charset="0"/>
-              </a:rPr>
-              <a:t>All flow </a:t>
-            </a:r>
-            <a:r>
               <a:rPr lang="en-US" altLang="en-US" sz="1200" dirty="0">
                 <a:latin typeface="+mn-lt"/>
                 <a:ea typeface="Amazon Ember" panose="020B0603020204020204" pitchFamily="34" charset="0"/>
                 <a:cs typeface="Arial" panose="020B0604020202020204" pitchFamily="34" charset="0"/>
               </a:rPr>
-              <a:t>logs</a:t>
+              <a:t>All flow logs</a:t>
             </a:r>
           </a:p>
         </p:txBody>
@@ -6876,7 +6405,6 @@
           <a:ln>
             <a:noFill/>
           </a:ln>
-          <a:extLst/>
         </p:spPr>
         <p:txBody>
           <a:bodyPr wrap="square" lIns="0" rIns="0">
@@ -6987,19 +6515,8 @@
                 <a:latin typeface="+mn-lt"/>
                 <a:cs typeface="Arial" panose="020B0604020202020204" pitchFamily="34" charset="0"/>
               </a:rPr>
-              <a:t>Internet </a:t>
+              <a:t>Internet gateway</a:t>
             </a:r>
-            <a:r>
-              <a:rPr lang="en-US" altLang="en-US" sz="1200" dirty="0" smtClean="0">
-                <a:latin typeface="+mn-lt"/>
-                <a:cs typeface="Arial" panose="020B0604020202020204" pitchFamily="34" charset="0"/>
-              </a:rPr>
-              <a:t>gateway</a:t>
-            </a:r>
-            <a:endParaRPr lang="en-US" altLang="en-US" sz="1200" dirty="0">
-              <a:latin typeface="+mn-lt"/>
-              <a:cs typeface="Arial" panose="020B0604020202020204" pitchFamily="34" charset="0"/>
-            </a:endParaRPr>
           </a:p>
         </p:txBody>
       </p:sp>
@@ -7755,7 +7272,7 @@
           <a:blip r:embed="rId2">
             <a:extLst>
               <a:ext uri="{96DAC541-7B7A-43D3-8B79-37D633B846F1}">
-                <asvg:svgBlip xmlns="" xmlns:asvg="http://schemas.microsoft.com/office/drawing/2016/SVG/main" r:embed="rId3"/>
+                <asvg:svgBlip xmlns:asvg="http://schemas.microsoft.com/office/drawing/2016/SVG/main" r:embed="rId3"/>
               </a:ext>
             </a:extLst>
           </a:blip>
@@ -9616,23 +9133,7 @@
                 <a:ea typeface="Amazon Ember" panose="020B0603020204020204" pitchFamily="34" charset="0"/>
                 <a:cs typeface="Arial" panose="020B0604020202020204" pitchFamily="34" charset="0"/>
               </a:rPr>
-              <a:t>AWS </a:t>
-            </a:r>
-            <a:r>
-              <a:rPr lang="en-US" altLang="en-US" sz="1200" dirty="0" smtClean="0">
-                <a:latin typeface="+mn-lt"/>
-                <a:ea typeface="Amazon Ember" panose="020B0603020204020204" pitchFamily="34" charset="0"/>
-                <a:cs typeface="Arial" panose="020B0604020202020204" pitchFamily="34" charset="0"/>
-              </a:rPr>
-              <a:t>Site-to-Site </a:t>
-            </a:r>
-            <a:r>
-              <a:rPr lang="en-US" altLang="en-US" sz="1200" dirty="0">
-                <a:latin typeface="+mn-lt"/>
-                <a:ea typeface="Amazon Ember" panose="020B0603020204020204" pitchFamily="34" charset="0"/>
-                <a:cs typeface="Arial" panose="020B0604020202020204" pitchFamily="34" charset="0"/>
-              </a:rPr>
-              <a:t>VPN</a:t>
+              <a:t>AWS Site-to-Site VPN</a:t>
             </a:r>
           </a:p>
         </p:txBody>
@@ -9922,23 +9423,8 @@
                 </a:solidFill>
                 <a:cs typeface="Arial" panose="020B0604020202020204" pitchFamily="34" charset="0"/>
               </a:rPr>
-              <a:t>Customer </a:t>
+              <a:t>Customer connectivity</a:t>
             </a:r>
-            <a:r>
-              <a:rPr lang="en-US" sz="1200" dirty="0" smtClean="0">
-                <a:solidFill>
-                  <a:srgbClr val="5A6B86"/>
-                </a:solidFill>
-                <a:cs typeface="Arial" panose="020B0604020202020204" pitchFamily="34" charset="0"/>
-              </a:rPr>
-              <a:t>connectivity</a:t>
-            </a:r>
-            <a:endParaRPr lang="en-US" sz="1200" dirty="0">
-              <a:solidFill>
-                <a:srgbClr val="5A6B86"/>
-              </a:solidFill>
-              <a:cs typeface="Arial" panose="020B0604020202020204" pitchFamily="34" charset="0"/>
-            </a:endParaRPr>
           </a:p>
         </p:txBody>
       </p:sp>
@@ -10200,18 +9686,13 @@
           <a:p>
             <a:pPr algn="ctr" eaLnBrk="1" hangingPunct="1"/>
             <a:r>
-              <a:rPr lang="en-US" altLang="en-US" sz="1200" dirty="0" smtClean="0">
+              <a:rPr lang="en-US" altLang="en-US" sz="1200" dirty="0">
                 <a:latin typeface="+mn-lt"/>
                 <a:ea typeface="Amazon Ember" panose="020B0603020204020204" pitchFamily="34" charset="0"/>
                 <a:cs typeface="Arial" panose="020B0604020202020204" pitchFamily="34" charset="0"/>
               </a:rPr>
               <a:t>AIM</a:t>
             </a:r>
-            <a:endParaRPr lang="en-US" altLang="en-US" sz="1200" dirty="0">
-              <a:latin typeface="+mn-lt"/>
-              <a:ea typeface="Amazon Ember" panose="020B0603020204020204" pitchFamily="34" charset="0"/>
-              <a:cs typeface="Arial" panose="020B0604020202020204" pitchFamily="34" charset="0"/>
-            </a:endParaRPr>
           </a:p>
         </p:txBody>
       </p:sp>
@@ -10426,18 +9907,13 @@
           <a:p>
             <a:pPr algn="ctr" eaLnBrk="1" hangingPunct="1"/>
             <a:r>
-              <a:rPr lang="en-US" altLang="en-US" sz="1200" dirty="0" smtClean="0">
+              <a:rPr lang="en-US" altLang="en-US" sz="1200" dirty="0">
                 <a:latin typeface="+mn-lt"/>
                 <a:ea typeface="Amazon Ember" panose="020B0603020204020204" pitchFamily="34" charset="0"/>
                 <a:cs typeface="Arial" panose="020B0604020202020204" pitchFamily="34" charset="0"/>
               </a:rPr>
               <a:t>Amazon SNS</a:t>
             </a:r>
-            <a:endParaRPr lang="en-US" altLang="en-US" sz="1200" dirty="0">
-              <a:latin typeface="+mn-lt"/>
-              <a:ea typeface="Amazon Ember" panose="020B0603020204020204" pitchFamily="34" charset="0"/>
-              <a:cs typeface="Arial" panose="020B0604020202020204" pitchFamily="34" charset="0"/>
-            </a:endParaRPr>
           </a:p>
         </p:txBody>
       </p:sp>
@@ -10657,21 +10133,8 @@
                 <a:ea typeface="Amazon Ember" panose="020B0603020204020204" pitchFamily="34" charset="0"/>
                 <a:cs typeface="Arial" panose="020B0604020202020204" pitchFamily="34" charset="0"/>
               </a:rPr>
-              <a:t>C</a:t>
+              <a:t>CloudTrail</a:t>
             </a:r>
-            <a:r>
-              <a:rPr lang="en-US" altLang="en-US" sz="1200" dirty="0" smtClean="0">
-                <a:latin typeface="+mn-lt"/>
-                <a:ea typeface="Amazon Ember" panose="020B0603020204020204" pitchFamily="34" charset="0"/>
-                <a:cs typeface="Arial" panose="020B0604020202020204" pitchFamily="34" charset="0"/>
-              </a:rPr>
-              <a:t>loudTrail</a:t>
-            </a:r>
-            <a:endParaRPr lang="en-US" altLang="en-US" sz="1200" dirty="0">
-              <a:latin typeface="+mn-lt"/>
-              <a:ea typeface="Amazon Ember" panose="020B0603020204020204" pitchFamily="34" charset="0"/>
-              <a:cs typeface="Arial" panose="020B0604020202020204" pitchFamily="34" charset="0"/>
-            </a:endParaRPr>
           </a:p>
         </p:txBody>
       </p:sp>
@@ -11373,18 +10836,13 @@
           <a:p>
             <a:pPr algn="ctr" eaLnBrk="1" hangingPunct="1"/>
             <a:r>
-              <a:rPr lang="en-US" altLang="en-US" sz="1200" dirty="0" smtClean="0">
+              <a:rPr lang="en-US" altLang="en-US" sz="1200" dirty="0">
                 <a:latin typeface="+mn-lt"/>
                 <a:ea typeface="Amazon Ember" panose="020B0603020204020204" pitchFamily="34" charset="0"/>
                 <a:cs typeface="Arial" panose="020B0604020202020204" pitchFamily="34" charset="0"/>
               </a:rPr>
               <a:t>CloudWatch</a:t>
             </a:r>
-            <a:endParaRPr lang="en-US" altLang="en-US" sz="1200" dirty="0">
-              <a:latin typeface="+mn-lt"/>
-              <a:ea typeface="Amazon Ember" panose="020B0603020204020204" pitchFamily="34" charset="0"/>
-              <a:cs typeface="Arial" panose="020B0604020202020204" pitchFamily="34" charset="0"/>
-            </a:endParaRPr>
           </a:p>
         </p:txBody>
       </p:sp>
@@ -11521,41 +10979,8 @@
                 </a:solidFill>
                 <a:cs typeface="Arial" panose="020B0604020202020204" pitchFamily="34" charset="0"/>
               </a:rPr>
-              <a:t>Access </a:t>
+              <a:t>Access control and alerting</a:t>
             </a:r>
-            <a:r>
-              <a:rPr lang="en-US" sz="1200" dirty="0" smtClean="0">
-                <a:solidFill>
-                  <a:srgbClr val="5A6B86"/>
-                </a:solidFill>
-                <a:cs typeface="Arial" panose="020B0604020202020204" pitchFamily="34" charset="0"/>
-              </a:rPr>
-              <a:t>control </a:t>
-            </a:r>
-            <a:r>
-              <a:rPr lang="en-US" sz="1200" dirty="0">
-                <a:solidFill>
-                  <a:srgbClr val="5A6B86"/>
-                </a:solidFill>
-                <a:cs typeface="Arial" panose="020B0604020202020204" pitchFamily="34" charset="0"/>
-              </a:rPr>
-              <a:t>and </a:t>
-            </a:r>
-            <a:r>
-              <a:rPr lang="en-US" sz="1200" dirty="0" smtClean="0">
-                <a:solidFill>
-                  <a:srgbClr val="5A6B86"/>
-                </a:solidFill>
-                <a:cs typeface="Arial" panose="020B0604020202020204" pitchFamily="34" charset="0"/>
-              </a:rPr>
-              <a:t>alerting</a:t>
-            </a:r>
-            <a:endParaRPr lang="en-US" sz="1200" dirty="0">
-              <a:solidFill>
-                <a:srgbClr val="5A6B86"/>
-              </a:solidFill>
-              <a:cs typeface="Arial" panose="020B0604020202020204" pitchFamily="34" charset="0"/>
-            </a:endParaRPr>
           </a:p>
         </p:txBody>
       </p:sp>
@@ -11710,18 +11135,13 @@
           <a:p>
             <a:pPr algn="ctr"/>
             <a:r>
-              <a:rPr lang="en-US" altLang="en-US" sz="1200" dirty="0" smtClean="0">
+              <a:rPr lang="en-US" altLang="en-US" sz="1200" dirty="0">
                 <a:latin typeface="+mn-lt"/>
                 <a:ea typeface="Amazon Ember" panose="020B0603020204020204" pitchFamily="34" charset="0"/>
                 <a:cs typeface="Arial" panose="020B0604020202020204" pitchFamily="34" charset="0"/>
               </a:rPr>
               <a:t>S3</a:t>
             </a:r>
-            <a:endParaRPr lang="en-US" altLang="en-US" sz="1200" dirty="0">
-              <a:latin typeface="+mn-lt"/>
-              <a:ea typeface="Amazon Ember" panose="020B0603020204020204" pitchFamily="34" charset="0"/>
-              <a:cs typeface="Arial" panose="020B0604020202020204" pitchFamily="34" charset="0"/>
-            </a:endParaRPr>
           </a:p>
         </p:txBody>
       </p:sp>
@@ -11876,18 +11296,13 @@
           <a:p>
             <a:pPr algn="ctr"/>
             <a:r>
-              <a:rPr lang="en-US" altLang="en-US" sz="1200" dirty="0" smtClean="0">
+              <a:rPr lang="en-US" altLang="en-US" sz="1200" dirty="0">
                 <a:latin typeface="+mn-lt"/>
                 <a:ea typeface="Amazon Ember" panose="020B0603020204020204" pitchFamily="34" charset="0"/>
                 <a:cs typeface="Arial" panose="020B0604020202020204" pitchFamily="34" charset="0"/>
               </a:rPr>
               <a:t>S3</a:t>
             </a:r>
-            <a:endParaRPr lang="en-US" altLang="en-US" sz="1200" dirty="0">
-              <a:latin typeface="+mn-lt"/>
-              <a:ea typeface="Amazon Ember" panose="020B0603020204020204" pitchFamily="34" charset="0"/>
-              <a:cs typeface="Arial" panose="020B0604020202020204" pitchFamily="34" charset="0"/>
-            </a:endParaRPr>
           </a:p>
         </p:txBody>
       </p:sp>
@@ -12042,18 +11457,13 @@
           <a:p>
             <a:pPr algn="ctr"/>
             <a:r>
-              <a:rPr lang="en-US" altLang="en-US" sz="1200" dirty="0" smtClean="0">
+              <a:rPr lang="en-US" altLang="en-US" sz="1200" dirty="0">
                 <a:latin typeface="+mn-lt"/>
                 <a:ea typeface="Amazon Ember" panose="020B0603020204020204" pitchFamily="34" charset="0"/>
                 <a:cs typeface="Arial" panose="020B0604020202020204" pitchFamily="34" charset="0"/>
               </a:rPr>
               <a:t>S3</a:t>
             </a:r>
-            <a:endParaRPr lang="en-US" altLang="en-US" sz="1200" dirty="0">
-              <a:latin typeface="+mn-lt"/>
-              <a:ea typeface="Amazon Ember" panose="020B0603020204020204" pitchFamily="34" charset="0"/>
-              <a:cs typeface="Arial" panose="020B0604020202020204" pitchFamily="34" charset="0"/>
-            </a:endParaRPr>
           </a:p>
         </p:txBody>
       </p:sp>
@@ -12536,20 +11946,12 @@
           <a:p>
             <a:pPr algn="ctr" eaLnBrk="1" hangingPunct="1"/>
             <a:r>
-              <a:rPr lang="en-US" altLang="en-US" sz="1200" dirty="0" smtClean="0">
-                <a:latin typeface="+mn-lt"/>
-                <a:ea typeface="Amazon Ember" panose="020B0603020204020204" pitchFamily="34" charset="0"/>
-                <a:cs typeface="Arial" panose="020B0604020202020204" pitchFamily="34" charset="0"/>
-              </a:rPr>
-              <a:t>All flow </a:t>
-            </a:r>
-            <a:r>
               <a:rPr lang="en-US" altLang="en-US" sz="1200" dirty="0">
                 <a:latin typeface="+mn-lt"/>
                 <a:ea typeface="Amazon Ember" panose="020B0603020204020204" pitchFamily="34" charset="0"/>
                 <a:cs typeface="Arial" panose="020B0604020202020204" pitchFamily="34" charset="0"/>
               </a:rPr>
-              <a:t>logs</a:t>
+              <a:t>All flow logs</a:t>
             </a:r>
           </a:p>
         </p:txBody>
@@ -12582,7 +11984,6 @@
           <a:ln>
             <a:noFill/>
           </a:ln>
-          <a:extLst/>
         </p:spPr>
         <p:txBody>
           <a:bodyPr wrap="square">
@@ -12739,7 +12140,6 @@
           <a:ln>
             <a:noFill/>
           </a:ln>
-          <a:extLst/>
         </p:spPr>
       </p:pic>
       <p:sp>
@@ -13142,18 +12542,13 @@
             <a:p>
               <a:pPr algn="ctr" eaLnBrk="1" hangingPunct="1"/>
               <a:r>
-                <a:rPr lang="en-US" altLang="en-US" sz="1200" dirty="0" smtClean="0">
+                <a:rPr lang="en-US" altLang="en-US" sz="1200" dirty="0">
                   <a:latin typeface="+mn-lt"/>
                   <a:ea typeface="Amazon Ember" panose="020B0603020204020204" pitchFamily="34" charset="0"/>
                   <a:cs typeface="Arial" panose="020B0604020202020204" pitchFamily="34" charset="0"/>
                 </a:rPr>
                 <a:t>CloudWatch</a:t>
               </a:r>
-              <a:endParaRPr lang="en-US" altLang="en-US" sz="1200" dirty="0">
-                <a:latin typeface="+mn-lt"/>
-                <a:ea typeface="Amazon Ember" panose="020B0603020204020204" pitchFamily="34" charset="0"/>
-                <a:cs typeface="Arial" panose="020B0604020202020204" pitchFamily="34" charset="0"/>
-              </a:endParaRPr>
             </a:p>
           </p:txBody>
         </p:sp>
@@ -13389,18 +12784,13 @@
             <a:p>
               <a:pPr algn="ctr" eaLnBrk="1" hangingPunct="1"/>
               <a:r>
-                <a:rPr lang="en-US" altLang="en-US" sz="1200" dirty="0" smtClean="0">
+                <a:rPr lang="en-US" altLang="en-US" sz="1200" dirty="0">
                   <a:latin typeface="+mn-lt"/>
                   <a:ea typeface="Amazon Ember" panose="020B0603020204020204" pitchFamily="34" charset="0"/>
                   <a:cs typeface="Arial" panose="020B0604020202020204" pitchFamily="34" charset="0"/>
                 </a:rPr>
                 <a:t>CloudTrail</a:t>
               </a:r>
-              <a:endParaRPr lang="en-US" altLang="en-US" sz="1200" dirty="0">
-                <a:latin typeface="+mn-lt"/>
-                <a:ea typeface="Amazon Ember" panose="020B0603020204020204" pitchFamily="34" charset="0"/>
-                <a:cs typeface="Arial" panose="020B0604020202020204" pitchFamily="34" charset="0"/>
-              </a:endParaRPr>
             </a:p>
           </p:txBody>
         </p:sp>
@@ -13798,20 +13188,12 @@
           <a:p>
             <a:pPr algn="ctr" eaLnBrk="1" hangingPunct="1"/>
             <a:r>
-              <a:rPr lang="en-US" altLang="en-US" sz="1200" dirty="0" smtClean="0">
-                <a:latin typeface="+mn-lt"/>
-                <a:ea typeface="Amazon Ember" panose="020B0603020204020204" pitchFamily="34" charset="0"/>
-                <a:cs typeface="Arial" panose="020B0604020202020204" pitchFamily="34" charset="0"/>
-              </a:rPr>
-              <a:t>All flow </a:t>
-            </a:r>
-            <a:r>
               <a:rPr lang="en-US" altLang="en-US" sz="1200" dirty="0">
                 <a:latin typeface="+mn-lt"/>
                 <a:ea typeface="Amazon Ember" panose="020B0603020204020204" pitchFamily="34" charset="0"/>
                 <a:cs typeface="Arial" panose="020B0604020202020204" pitchFamily="34" charset="0"/>
               </a:rPr>
-              <a:t>logs</a:t>
+              <a:t>All flow logs</a:t>
             </a:r>
           </a:p>
         </p:txBody>
@@ -14188,18 +13570,13 @@
           <a:p>
             <a:pPr algn="ctr"/>
             <a:r>
-              <a:rPr lang="en-US" altLang="en-US" sz="1200" dirty="0" smtClean="0">
+              <a:rPr lang="en-US" altLang="en-US" sz="1200" dirty="0">
                 <a:latin typeface="+mn-lt"/>
                 <a:ea typeface="Amazon Ember" panose="020B0603020204020204" pitchFamily="34" charset="0"/>
                 <a:cs typeface="Arial" panose="020B0604020202020204" pitchFamily="34" charset="0"/>
               </a:rPr>
               <a:t>S3</a:t>
             </a:r>
-            <a:endParaRPr lang="en-US" altLang="en-US" sz="1200" dirty="0">
-              <a:latin typeface="+mn-lt"/>
-              <a:ea typeface="Amazon Ember" panose="020B0603020204020204" pitchFamily="34" charset="0"/>
-              <a:cs typeface="Arial" panose="020B0604020202020204" pitchFamily="34" charset="0"/>
-            </a:endParaRPr>
           </a:p>
         </p:txBody>
       </p:sp>
@@ -14564,18 +13941,13 @@
           <a:p>
             <a:pPr algn="ctr"/>
             <a:r>
-              <a:rPr lang="en-US" altLang="en-US" sz="1200" dirty="0" smtClean="0">
+              <a:rPr lang="en-US" altLang="en-US" sz="1200" dirty="0">
                 <a:latin typeface="+mn-lt"/>
                 <a:ea typeface="Amazon Ember" panose="020B0603020204020204" pitchFamily="34" charset="0"/>
                 <a:cs typeface="Arial" panose="020B0604020202020204" pitchFamily="34" charset="0"/>
               </a:rPr>
               <a:t>S3</a:t>
             </a:r>
-            <a:endParaRPr lang="en-US" altLang="en-US" sz="1200" dirty="0">
-              <a:latin typeface="+mn-lt"/>
-              <a:ea typeface="Amazon Ember" panose="020B0603020204020204" pitchFamily="34" charset="0"/>
-              <a:cs typeface="Arial" panose="020B0604020202020204" pitchFamily="34" charset="0"/>
-            </a:endParaRPr>
           </a:p>
         </p:txBody>
       </p:sp>
@@ -14730,18 +14102,13 @@
           <a:p>
             <a:pPr algn="ctr"/>
             <a:r>
-              <a:rPr lang="en-US" altLang="en-US" sz="1200" dirty="0" smtClean="0">
+              <a:rPr lang="en-US" altLang="en-US" sz="1200" dirty="0">
                 <a:latin typeface="+mn-lt"/>
                 <a:ea typeface="Amazon Ember" panose="020B0603020204020204" pitchFamily="34" charset="0"/>
                 <a:cs typeface="Arial" panose="020B0604020202020204" pitchFamily="34" charset="0"/>
               </a:rPr>
               <a:t>S3</a:t>
             </a:r>
-            <a:endParaRPr lang="en-US" altLang="en-US" sz="1200" dirty="0">
-              <a:latin typeface="+mn-lt"/>
-              <a:ea typeface="Amazon Ember" panose="020B0603020204020204" pitchFamily="34" charset="0"/>
-              <a:cs typeface="Arial" panose="020B0604020202020204" pitchFamily="34" charset="0"/>
-            </a:endParaRPr>
           </a:p>
         </p:txBody>
       </p:sp>

</xml_diff>